<commit_message>
Tweaking slide stack for CDL Tech-X condensed version
</commit_message>
<xml_diff>
--- a/CDL-tech-x-condensed-version.pptx
+++ b/CDL-tech-x-condensed-version.pptx
@@ -5,7 +5,7 @@
     <p:sldMasterId id="2147483648" r:id="rId1"/>
   </p:sldMasterIdLst>
   <p:notesMasterIdLst>
-    <p:notesMasterId r:id="rId25"/>
+    <p:notesMasterId r:id="rId24"/>
   </p:notesMasterIdLst>
   <p:sldIdLst>
     <p:sldId id="256" r:id="rId2"/>
@@ -27,10 +27,9 @@
     <p:sldId id="274" r:id="rId18"/>
     <p:sldId id="288" r:id="rId19"/>
     <p:sldId id="290" r:id="rId20"/>
-    <p:sldId id="282" r:id="rId21"/>
-    <p:sldId id="275" r:id="rId22"/>
-    <p:sldId id="287" r:id="rId23"/>
-    <p:sldId id="260" r:id="rId24"/>
+    <p:sldId id="275" r:id="rId21"/>
+    <p:sldId id="287" r:id="rId22"/>
+    <p:sldId id="260" r:id="rId23"/>
   </p:sldIdLst>
   <p:sldSz cx="12192000" cy="6858000"/>
   <p:notesSz cx="6858000" cy="9144000"/>
@@ -275,7 +274,7 @@
           <a:p>
             <a:fld id="{1D896817-C553-DC40-BD68-E09EA78F3436}" type="datetimeFigureOut">
               <a:rPr lang="en-US" smtClean="0"/>
-              <a:t>3/16/21</a:t>
+              <a:t>3/18/21</a:t>
             </a:fld>
             <a:endParaRPr lang="en-US"/>
           </a:p>
@@ -588,7 +587,7 @@
           <a:p>
             <a:r>
               <a:rPr lang="en-US" dirty="0"/>
-              <a:t>I promise I’m not going to fill this workshop with heavy quotes from computer science classics, but I *did* want to explain the title of the workshop a bit, because it’s important to me. ”Bringing Order to Chaos” is the title of the section from which I pulled this quote. [read quote] Smaller and smaller parts, and you need only comprehend each part, rather than everything at once.</a:t>
+              <a:t>Thanks for letting me run through these slides before I present them at Code4Lib, this will help me find the rough parts, and will I hope inform y’all about what it is I’m working on lately.</a:t>
             </a:r>
           </a:p>
         </p:txBody>
@@ -610,7 +609,7 @@
           <a:p>
             <a:fld id="{07F65287-0258-BC43-8221-F86E5F96768A}" type="slidenum">
               <a:rPr lang="en-US" smtClean="0"/>
-              <a:t>2</a:t>
+              <a:t>1</a:t>
             </a:fld>
             <a:endParaRPr lang="en-US"/>
           </a:p>
@@ -619,7 +618,7 @@
     </p:spTree>
     <p:extLst>
       <p:ext uri="{BB962C8B-B14F-4D97-AF65-F5344CB8AC3E}">
-        <p14:creationId xmlns:p14="http://schemas.microsoft.com/office/powerpoint/2010/main" val="1418658710"/>
+        <p14:creationId xmlns:p14="http://schemas.microsoft.com/office/powerpoint/2010/main" val="1940010077"/>
       </p:ext>
     </p:extLst>
   </p:cSld>
@@ -675,7 +674,15 @@
           <a:p>
             <a:r>
               <a:rPr lang="en-US" dirty="0"/>
-              <a:t>At its core, Lando prepackages docker images for various services and technologies. Here are a few.</a:t>
+              <a:t>I should admit right now that I’ve borrowed these intro slides from the Lando folks, they have a Google drive full of slide decks. Like a lot of opensource projects, they have a ton of resources and docs. The best place to start reading about Lando is </a:t>
+            </a:r>
+            <a:r>
+              <a:rPr lang="en-US" dirty="0" err="1"/>
+              <a:t>docs.lando.dev</a:t>
+            </a:r>
+            <a:r>
+              <a:rPr lang="en-US" dirty="0"/>
+              <a:t>. “Stacks on Stacks on Racks” is their explanation of Lando. It starts with your operating system, which includes tech for containers, and then Docker running on that, and Docker Compose on top of Docker, and then Lando.</a:t>
             </a:r>
           </a:p>
         </p:txBody>
@@ -697,7 +704,7 @@
           <a:p>
             <a:fld id="{07F65287-0258-BC43-8221-F86E5F96768A}" type="slidenum">
               <a:rPr lang="en-US" smtClean="0"/>
-              <a:t>11</a:t>
+              <a:t>10</a:t>
             </a:fld>
             <a:endParaRPr lang="en-US"/>
           </a:p>
@@ -706,7 +713,7 @@
     </p:spTree>
     <p:extLst>
       <p:ext uri="{BB962C8B-B14F-4D97-AF65-F5344CB8AC3E}">
-        <p14:creationId xmlns:p14="http://schemas.microsoft.com/office/powerpoint/2010/main" val="1360150314"/>
+        <p14:creationId xmlns:p14="http://schemas.microsoft.com/office/powerpoint/2010/main" val="326291708"/>
       </p:ext>
     </p:extLst>
   </p:cSld>
@@ -762,7 +769,7 @@
           <a:p>
             <a:r>
               <a:rPr lang="en-US" dirty="0"/>
-              <a:t>And here are a few more. Each of these services is configurable, and you can swap in different ones (like use MySQL as a database, and then you can experiment using PostgreSQL instead)</a:t>
+              <a:t>At its core, Lando prepackages docker images for various services and technologies. Here are a few.</a:t>
             </a:r>
           </a:p>
         </p:txBody>
@@ -784,7 +791,7 @@
           <a:p>
             <a:fld id="{07F65287-0258-BC43-8221-F86E5F96768A}" type="slidenum">
               <a:rPr lang="en-US" smtClean="0"/>
-              <a:t>12</a:t>
+              <a:t>11</a:t>
             </a:fld>
             <a:endParaRPr lang="en-US"/>
           </a:p>
@@ -793,7 +800,7 @@
     </p:spTree>
     <p:extLst>
       <p:ext uri="{BB962C8B-B14F-4D97-AF65-F5344CB8AC3E}">
-        <p14:creationId xmlns:p14="http://schemas.microsoft.com/office/powerpoint/2010/main" val="2374417366"/>
+        <p14:creationId xmlns:p14="http://schemas.microsoft.com/office/powerpoint/2010/main" val="1360150314"/>
       </p:ext>
     </p:extLst>
   </p:cSld>
@@ -849,7 +856,7 @@
           <a:p>
             <a:r>
               <a:rPr lang="en-US" dirty="0"/>
-              <a:t>The Lando docs site makes a big deal about recipes, they’re flashy and can get you going quickly, but really, most of us are going to be working on stuff that is a bit more complicated than a Drupal site. (No offense, Drupal folks). We *will* use the LAMP recipe for Omeka, and if you have a PHP app like Omeka or OJS, a Lando recipe is a very fast way to get to work.</a:t>
+              <a:t>And here are a few more. Each of these services is configurable, and you can swap in different ones (like use MySQL as a database, and then you can experiment using PostgreSQL instead)</a:t>
             </a:r>
           </a:p>
         </p:txBody>
@@ -871,7 +878,7 @@
           <a:p>
             <a:fld id="{07F65287-0258-BC43-8221-F86E5F96768A}" type="slidenum">
               <a:rPr lang="en-US" smtClean="0"/>
-              <a:t>13</a:t>
+              <a:t>12</a:t>
             </a:fld>
             <a:endParaRPr lang="en-US"/>
           </a:p>
@@ -880,7 +887,7 @@
     </p:spTree>
     <p:extLst>
       <p:ext uri="{BB962C8B-B14F-4D97-AF65-F5344CB8AC3E}">
-        <p14:creationId xmlns:p14="http://schemas.microsoft.com/office/powerpoint/2010/main" val="1141383494"/>
+        <p14:creationId xmlns:p14="http://schemas.microsoft.com/office/powerpoint/2010/main" val="2374417366"/>
       </p:ext>
     </p:extLst>
   </p:cSld>
@@ -936,15 +943,7 @@
           <a:p>
             <a:r>
               <a:rPr lang="en-US" dirty="0"/>
-              <a:t>Installing is easy, just download the thing, click on the thing, agree to terms. If you already have Docker and Docker-Compose installed, you don’t need to reinstall </a:t>
-            </a:r>
-            <a:r>
-              <a:rPr lang="en-US" dirty="0" err="1"/>
-              <a:t>Lando’s</a:t>
-            </a:r>
-            <a:r>
-              <a:rPr lang="en-US" dirty="0"/>
-              <a:t> versions, but do verify that the versions you are running are at least the same as what Lando wants to install. If not, you may want to upgrade your docker setup.</a:t>
+              <a:t>The Lando docs site makes a big deal about recipes, they’re flashy and can get you going quickly, but really, most of us are going to be working on stuff that is a bit more complicated than a Drupal site. (No offense, Drupal folks). We *will* use the LAMP recipe for Omeka, and if you have a PHP app like Omeka or OJS, a Lando recipe is a very fast way to get to work.</a:t>
             </a:r>
           </a:p>
         </p:txBody>
@@ -966,7 +965,7 @@
           <a:p>
             <a:fld id="{07F65287-0258-BC43-8221-F86E5F96768A}" type="slidenum">
               <a:rPr lang="en-US" smtClean="0"/>
-              <a:t>14</a:t>
+              <a:t>13</a:t>
             </a:fld>
             <a:endParaRPr lang="en-US"/>
           </a:p>
@@ -975,7 +974,7 @@
     </p:spTree>
     <p:extLst>
       <p:ext uri="{BB962C8B-B14F-4D97-AF65-F5344CB8AC3E}">
-        <p14:creationId xmlns:p14="http://schemas.microsoft.com/office/powerpoint/2010/main" val="1223936442"/>
+        <p14:creationId xmlns:p14="http://schemas.microsoft.com/office/powerpoint/2010/main" val="1141383494"/>
       </p:ext>
     </p:extLst>
   </p:cSld>
@@ -1031,15 +1030,15 @@
           <a:p>
             <a:r>
               <a:rPr lang="en-US" dirty="0"/>
-              <a:t>The </a:t>
+              <a:t>Installing is easy, just download the thing, click on the thing, agree to terms. If you already have Docker and Docker-Compose installed, you don’t need to reinstall </a:t>
             </a:r>
             <a:r>
               <a:rPr lang="en-US" dirty="0" err="1"/>
-              <a:t>Landofile</a:t>
-            </a:r>
-            <a:r>
-              <a:rPr lang="en-US" dirty="0"/>
-              <a:t> is the heart of what tells Lando what to do. It goes into your project root, next to all of your source code.</a:t>
+              <a:t>Lando’s</a:t>
+            </a:r>
+            <a:r>
+              <a:rPr lang="en-US" dirty="0"/>
+              <a:t> versions, but do verify that the versions you are running are at least the same as what Lando wants to install. If not, you may want to upgrade your docker setup.</a:t>
             </a:r>
           </a:p>
         </p:txBody>
@@ -1061,7 +1060,7 @@
           <a:p>
             <a:fld id="{07F65287-0258-BC43-8221-F86E5F96768A}" type="slidenum">
               <a:rPr lang="en-US" smtClean="0"/>
-              <a:t>15</a:t>
+              <a:t>14</a:t>
             </a:fld>
             <a:endParaRPr lang="en-US"/>
           </a:p>
@@ -1070,7 +1069,7 @@
     </p:spTree>
     <p:extLst>
       <p:ext uri="{BB962C8B-B14F-4D97-AF65-F5344CB8AC3E}">
-        <p14:creationId xmlns:p14="http://schemas.microsoft.com/office/powerpoint/2010/main" val="3625839814"/>
+        <p14:creationId xmlns:p14="http://schemas.microsoft.com/office/powerpoint/2010/main" val="1223936442"/>
       </p:ext>
     </p:extLst>
   </p:cSld>
@@ -1126,7 +1125,7 @@
           <a:p>
             <a:r>
               <a:rPr lang="en-US" dirty="0"/>
-              <a:t>This is a sketch of a </a:t>
+              <a:t>The </a:t>
             </a:r>
             <a:r>
               <a:rPr lang="en-US" dirty="0" err="1"/>
@@ -1134,31 +1133,7 @@
             </a:r>
             <a:r>
               <a:rPr lang="en-US" dirty="0"/>
-              <a:t>. It’s not complete, but gives you an idea of what one looks like. It’s </a:t>
-            </a:r>
-            <a:r>
-              <a:rPr lang="en-US" dirty="0" err="1"/>
-              <a:t>yaml</a:t>
-            </a:r>
-            <a:r>
-              <a:rPr lang="en-US" dirty="0"/>
-              <a:t>, so, you know, </a:t>
-            </a:r>
-            <a:r>
-              <a:rPr lang="en-US" dirty="0" err="1"/>
-              <a:t>gotta</a:t>
-            </a:r>
-            <a:r>
-              <a:rPr lang="en-US" dirty="0"/>
-              <a:t> start with three dashes. We’ll dig into the details through the rest of this workshop, but some things I want you to remember: you can specify environment variables in env files, you can provide as many as you need. SSH key management is mostly automatic with Lando (it copies your SSH keys for you), but you can control which key gets used by specifying it in the </a:t>
-            </a:r>
-            <a:r>
-              <a:rPr lang="en-US" dirty="0" err="1"/>
-              <a:t>Landofile</a:t>
-            </a:r>
-            <a:r>
-              <a:rPr lang="en-US" dirty="0"/>
-              <a:t>. Then you have SERVICES and TOOLING. Services are the pieces you need to develop your application. Tooling defines how you’ll interact with those services on the command line. Tooling is probably the most fun aspect of working with Lando, as the feedback loop is instantaneous. As soon as you add a new tooling config, you can use it, no reboot, no rebuild. Just dream it, write it, use it. I am skipping a few things with this sketch, such as recipe configuration. You don’t NEED to use a recipe with Lando, but I’ll show you one now.</a:t>
+              <a:t> is the heart of what tells Lando what to do. It goes into your project root, next to all of your source code.</a:t>
             </a:r>
           </a:p>
         </p:txBody>
@@ -1180,7 +1155,7 @@
           <a:p>
             <a:fld id="{07F65287-0258-BC43-8221-F86E5F96768A}" type="slidenum">
               <a:rPr lang="en-US" smtClean="0"/>
-              <a:t>16</a:t>
+              <a:t>15</a:t>
             </a:fld>
             <a:endParaRPr lang="en-US"/>
           </a:p>
@@ -1189,7 +1164,7 @@
     </p:spTree>
     <p:extLst>
       <p:ext uri="{BB962C8B-B14F-4D97-AF65-F5344CB8AC3E}">
-        <p14:creationId xmlns:p14="http://schemas.microsoft.com/office/powerpoint/2010/main" val="2212794323"/>
+        <p14:creationId xmlns:p14="http://schemas.microsoft.com/office/powerpoint/2010/main" val="3625839814"/>
       </p:ext>
     </p:extLst>
   </p:cSld>
@@ -1245,7 +1220,7 @@
           <a:p>
             <a:r>
               <a:rPr lang="en-US" dirty="0"/>
-              <a:t>Here’s a quick look at a </a:t>
+              <a:t>This is a sketch of a </a:t>
             </a:r>
             <a:r>
               <a:rPr lang="en-US" dirty="0" err="1"/>
@@ -1253,7 +1228,31 @@
             </a:r>
             <a:r>
               <a:rPr lang="en-US" dirty="0"/>
-              <a:t> that uses a recipe: this uses the Lamp recipe, so you specify what version of PHP you want to use, and what DB you want to use, and everything is auto-configured by convention. If a Lamp stack is what your app needs, this will get you going.</a:t>
+              <a:t>. It’s not complete, but gives you an idea of what one looks like. It’s </a:t>
+            </a:r>
+            <a:r>
+              <a:rPr lang="en-US" dirty="0" err="1"/>
+              <a:t>yaml</a:t>
+            </a:r>
+            <a:r>
+              <a:rPr lang="en-US" dirty="0"/>
+              <a:t>, so, you know, </a:t>
+            </a:r>
+            <a:r>
+              <a:rPr lang="en-US" dirty="0" err="1"/>
+              <a:t>gotta</a:t>
+            </a:r>
+            <a:r>
+              <a:rPr lang="en-US" dirty="0"/>
+              <a:t> start with three dashes. We’ll dig into the details through the rest of this workshop, but some things I want you to remember: you can specify environment variables in env files, you can provide as many as you need. SSH key management is mostly automatic with Lando (it copies your SSH keys for you), but you can control which key gets used by specifying it in the </a:t>
+            </a:r>
+            <a:r>
+              <a:rPr lang="en-US" dirty="0" err="1"/>
+              <a:t>Landofile</a:t>
+            </a:r>
+            <a:r>
+              <a:rPr lang="en-US" dirty="0"/>
+              <a:t>. Then you have SERVICES and TOOLING. Services are the pieces you need to develop your application. Tooling defines how you’ll interact with those services on the command line. Tooling is probably the most fun aspect of working with Lando, as the feedback loop is instantaneous. As soon as you add a new tooling config, you can use it, no reboot, no rebuild. Just dream it, write it, use it. I am skipping a few things with this sketch, such as recipe configuration. You don’t NEED to use a recipe with Lando, but I’ll show you one now.</a:t>
             </a:r>
           </a:p>
         </p:txBody>
@@ -1275,7 +1274,7 @@
           <a:p>
             <a:fld id="{07F65287-0258-BC43-8221-F86E5F96768A}" type="slidenum">
               <a:rPr lang="en-US" smtClean="0"/>
-              <a:t>17</a:t>
+              <a:t>16</a:t>
             </a:fld>
             <a:endParaRPr lang="en-US"/>
           </a:p>
@@ -1284,7 +1283,7 @@
     </p:spTree>
     <p:extLst>
       <p:ext uri="{BB962C8B-B14F-4D97-AF65-F5344CB8AC3E}">
-        <p14:creationId xmlns:p14="http://schemas.microsoft.com/office/powerpoint/2010/main" val="3778597517"/>
+        <p14:creationId xmlns:p14="http://schemas.microsoft.com/office/powerpoint/2010/main" val="2212794323"/>
       </p:ext>
     </p:extLst>
   </p:cSld>
@@ -1340,7 +1339,7 @@
           <a:p>
             <a:r>
               <a:rPr lang="en-US" dirty="0"/>
-              <a:t>After you start up Lando with your </a:t>
+              <a:t>Here’s a quick look at a </a:t>
             </a:r>
             <a:r>
               <a:rPr lang="en-US" dirty="0" err="1"/>
@@ -1348,39 +1347,7 @@
             </a:r>
             <a:r>
               <a:rPr lang="en-US" dirty="0"/>
-              <a:t> in place, what happens? I made you a Lando cheat sheet, you should check that URL and print it out, keep it handy. Thanks to the magic of Docker mounts, your </a:t>
-            </a:r>
-            <a:r>
-              <a:rPr lang="en-US" dirty="0" err="1"/>
-              <a:t>project_root</a:t>
-            </a:r>
-            <a:r>
-              <a:rPr lang="en-US" dirty="0"/>
-              <a:t> folder is mounted as /app in every service container you define in your </a:t>
-            </a:r>
-            <a:r>
-              <a:rPr lang="en-US" dirty="0" err="1"/>
-              <a:t>Landofile</a:t>
-            </a:r>
-            <a:r>
-              <a:rPr lang="en-US" dirty="0"/>
-              <a:t>. It’s in the DB, in Solr, in your </a:t>
-            </a:r>
-            <a:r>
-              <a:rPr lang="en-US" dirty="0" err="1"/>
-              <a:t>Appserver</a:t>
-            </a:r>
-            <a:r>
-              <a:rPr lang="en-US" dirty="0"/>
-              <a:t>. This is for convenience. And it *is* convenient, knowing where your application code is. So, I want you to have this mental model ready for later. Your </a:t>
-            </a:r>
-            <a:r>
-              <a:rPr lang="en-US" dirty="0" err="1"/>
-              <a:t>project_root</a:t>
-            </a:r>
-            <a:r>
-              <a:rPr lang="en-US" dirty="0"/>
-              <a:t> is at /app.</a:t>
+              <a:t> that uses a recipe: this uses the Lamp recipe, so you specify what version of PHP you want to use, and what DB you want to use, and everything is auto-configured by convention. If a Lamp stack is what your app needs, this will get you going.</a:t>
             </a:r>
           </a:p>
         </p:txBody>
@@ -1402,7 +1369,7 @@
           <a:p>
             <a:fld id="{07F65287-0258-BC43-8221-F86E5F96768A}" type="slidenum">
               <a:rPr lang="en-US" smtClean="0"/>
-              <a:t>18</a:t>
+              <a:t>17</a:t>
             </a:fld>
             <a:endParaRPr lang="en-US"/>
           </a:p>
@@ -1411,7 +1378,7 @@
     </p:spTree>
     <p:extLst>
       <p:ext uri="{BB962C8B-B14F-4D97-AF65-F5344CB8AC3E}">
-        <p14:creationId xmlns:p14="http://schemas.microsoft.com/office/powerpoint/2010/main" val="1022956409"/>
+        <p14:creationId xmlns:p14="http://schemas.microsoft.com/office/powerpoint/2010/main" val="3778597517"/>
       </p:ext>
     </p:extLst>
   </p:cSld>
@@ -1467,7 +1434,7 @@
           <a:p>
             <a:r>
               <a:rPr lang="en-US" dirty="0"/>
-              <a:t>Here’s my name dropping slide. The first two are cheating a bit, I wrote those files. I just found out that Princeton uses Lando for a project. And there’s the link to every </a:t>
+              <a:t>After you start up Lando with your </a:t>
             </a:r>
             <a:r>
               <a:rPr lang="en-US" dirty="0" err="1"/>
@@ -1475,15 +1442,39 @@
             </a:r>
             <a:r>
               <a:rPr lang="en-US" dirty="0"/>
-              <a:t> in </a:t>
+              <a:t> in place, what happens? I made you a Lando cheat sheet, you should check that URL and print it out, keep it handy. Thanks to the magic of Docker mounts, your </a:t>
             </a:r>
             <a:r>
               <a:rPr lang="en-US" dirty="0" err="1"/>
-              <a:t>Github</a:t>
-            </a:r>
-            <a:r>
-              <a:rPr lang="en-US" dirty="0"/>
-              <a:t>, if you want to explore more.</a:t>
+              <a:t>project_root</a:t>
+            </a:r>
+            <a:r>
+              <a:rPr lang="en-US" dirty="0"/>
+              <a:t> folder is mounted as /app in every service container you define in your </a:t>
+            </a:r>
+            <a:r>
+              <a:rPr lang="en-US" dirty="0" err="1"/>
+              <a:t>Landofile</a:t>
+            </a:r>
+            <a:r>
+              <a:rPr lang="en-US" dirty="0"/>
+              <a:t>. It’s in the DB, in Solr, in your </a:t>
+            </a:r>
+            <a:r>
+              <a:rPr lang="en-US" dirty="0" err="1"/>
+              <a:t>Appserver</a:t>
+            </a:r>
+            <a:r>
+              <a:rPr lang="en-US" dirty="0"/>
+              <a:t>. This is for convenience. And it *is* convenient, knowing where your application code is. So, I want you to have this mental model ready for later. Your </a:t>
+            </a:r>
+            <a:r>
+              <a:rPr lang="en-US" dirty="0" err="1"/>
+              <a:t>project_root</a:t>
+            </a:r>
+            <a:r>
+              <a:rPr lang="en-US" dirty="0"/>
+              <a:t> is at /app.</a:t>
             </a:r>
           </a:p>
         </p:txBody>
@@ -1505,7 +1496,7 @@
           <a:p>
             <a:fld id="{07F65287-0258-BC43-8221-F86E5F96768A}" type="slidenum">
               <a:rPr lang="en-US" smtClean="0"/>
-              <a:t>19</a:t>
+              <a:t>18</a:t>
             </a:fld>
             <a:endParaRPr lang="en-US"/>
           </a:p>
@@ -1514,7 +1505,7 @@
     </p:spTree>
     <p:extLst>
       <p:ext uri="{BB962C8B-B14F-4D97-AF65-F5344CB8AC3E}">
-        <p14:creationId xmlns:p14="http://schemas.microsoft.com/office/powerpoint/2010/main" val="2825404227"/>
+        <p14:creationId xmlns:p14="http://schemas.microsoft.com/office/powerpoint/2010/main" val="1022956409"/>
       </p:ext>
     </p:extLst>
   </p:cSld>
@@ -1570,7 +1561,23 @@
           <a:p>
             <a:r>
               <a:rPr lang="en-US" dirty="0"/>
-              <a:t>OK, before I do a demo of Lando, any questions? Do we need a quick break?</a:t>
+              <a:t>Here’s my name dropping slide. The first two are cheating a bit, I wrote those files. I just found out that Princeton uses Lando for a project. And there’s the link to every </a:t>
+            </a:r>
+            <a:r>
+              <a:rPr lang="en-US" dirty="0" err="1"/>
+              <a:t>Landofile</a:t>
+            </a:r>
+            <a:r>
+              <a:rPr lang="en-US" dirty="0"/>
+              <a:t> in </a:t>
+            </a:r>
+            <a:r>
+              <a:rPr lang="en-US" dirty="0" err="1"/>
+              <a:t>Github</a:t>
+            </a:r>
+            <a:r>
+              <a:rPr lang="en-US" dirty="0"/>
+              <a:t>, if you want to explore more.</a:t>
             </a:r>
           </a:p>
         </p:txBody>
@@ -1592,7 +1599,7 @@
           <a:p>
             <a:fld id="{07F65287-0258-BC43-8221-F86E5F96768A}" type="slidenum">
               <a:rPr lang="en-US" smtClean="0"/>
-              <a:t>20</a:t>
+              <a:t>19</a:t>
             </a:fld>
             <a:endParaRPr lang="en-US"/>
           </a:p>
@@ -1601,7 +1608,7 @@
     </p:spTree>
     <p:extLst>
       <p:ext uri="{BB962C8B-B14F-4D97-AF65-F5344CB8AC3E}">
-        <p14:creationId xmlns:p14="http://schemas.microsoft.com/office/powerpoint/2010/main" val="1324921279"/>
+        <p14:creationId xmlns:p14="http://schemas.microsoft.com/office/powerpoint/2010/main" val="2825404227"/>
       </p:ext>
     </p:extLst>
   </p:cSld>
@@ -1657,7 +1664,7 @@
           <a:p>
             <a:r>
               <a:rPr lang="en-US" dirty="0"/>
-              <a:t>What kind of chaos are we talking about? With dev environments, these are the options I’ve seen in use for various projects. On the left of the yarn, we have more ordered options, on the right, less so. I’m biased, so I put Lando at the base of the ordered side.</a:t>
+              <a:t>I promise I’m not going to fill this workshop with heavy quotes from computer science classics, but I *did* want to explain the title of the workshop a bit, because it’s important to me. ”Bringing Order to Chaos” is the title of the section from which I pulled this quote. [read quote] Smaller and smaller parts, and you need only comprehend each part, rather than everything at once.</a:t>
             </a:r>
           </a:p>
         </p:txBody>
@@ -1679,7 +1686,7 @@
           <a:p>
             <a:fld id="{07F65287-0258-BC43-8221-F86E5F96768A}" type="slidenum">
               <a:rPr lang="en-US" smtClean="0"/>
-              <a:t>3</a:t>
+              <a:t>2</a:t>
             </a:fld>
             <a:endParaRPr lang="en-US"/>
           </a:p>
@@ -1688,7 +1695,7 @@
     </p:spTree>
     <p:extLst>
       <p:ext uri="{BB962C8B-B14F-4D97-AF65-F5344CB8AC3E}">
-        <p14:creationId xmlns:p14="http://schemas.microsoft.com/office/powerpoint/2010/main" val="1892846666"/>
+        <p14:creationId xmlns:p14="http://schemas.microsoft.com/office/powerpoint/2010/main" val="1418658710"/>
       </p:ext>
     </p:extLst>
   </p:cSld>
@@ -1744,7 +1751,7 @@
           <a:p>
             <a:r>
               <a:rPr lang="en-US" dirty="0"/>
-              <a:t>Here’s a quick demo of Lando, to give you an idea of what working with it is like.</a:t>
+              <a:t>If we have time, I’d like to demo creating a dev environment from scratch, in the same way I’ll show people during the workshop.</a:t>
             </a:r>
           </a:p>
         </p:txBody>
@@ -1766,7 +1773,7 @@
           <a:p>
             <a:fld id="{07F65287-0258-BC43-8221-F86E5F96768A}" type="slidenum">
               <a:rPr lang="en-US" smtClean="0"/>
-              <a:t>21</a:t>
+              <a:t>20</a:t>
             </a:fld>
             <a:endParaRPr lang="en-US"/>
           </a:p>
@@ -1853,7 +1860,7 @@
           <a:p>
             <a:fld id="{07F65287-0258-BC43-8221-F86E5F96768A}" type="slidenum">
               <a:rPr lang="en-US" smtClean="0"/>
-              <a:t>22</a:t>
+              <a:t>21</a:t>
             </a:fld>
             <a:endParaRPr lang="en-US"/>
           </a:p>
@@ -1940,7 +1947,7 @@
           <a:p>
             <a:fld id="{07F65287-0258-BC43-8221-F86E5F96768A}" type="slidenum">
               <a:rPr lang="en-US" smtClean="0"/>
-              <a:t>23</a:t>
+              <a:t>22</a:t>
             </a:fld>
             <a:endParaRPr lang="en-US"/>
           </a:p>
@@ -2005,7 +2012,7 @@
           <a:p>
             <a:r>
               <a:rPr lang="en-US" dirty="0"/>
-              <a:t>We aren’t going to dive deeply into Docker, because we don’t need to, we just need to keep in mind that Docker is what enables Lando to help us build a development environment. The most important part to know is that Docker is software that helps us organize our project environments into the parts we need. Like a database and an app server.</a:t>
+              <a:t>What kind of chaos are we talking about? With dev environments, these are the options I’ve seen in use for various projects. On the left of the yarn, we have more ordered options, on the right, less so. I’m biased, so I put Lando at the base of the ordered side.</a:t>
             </a:r>
           </a:p>
         </p:txBody>
@@ -2027,7 +2034,7 @@
           <a:p>
             <a:fld id="{07F65287-0258-BC43-8221-F86E5F96768A}" type="slidenum">
               <a:rPr lang="en-US" smtClean="0"/>
-              <a:t>4</a:t>
+              <a:t>3</a:t>
             </a:fld>
             <a:endParaRPr lang="en-US"/>
           </a:p>
@@ -2036,7 +2043,7 @@
     </p:spTree>
     <p:extLst>
       <p:ext uri="{BB962C8B-B14F-4D97-AF65-F5344CB8AC3E}">
-        <p14:creationId xmlns:p14="http://schemas.microsoft.com/office/powerpoint/2010/main" val="3064967801"/>
+        <p14:creationId xmlns:p14="http://schemas.microsoft.com/office/powerpoint/2010/main" val="1892846666"/>
       </p:ext>
     </p:extLst>
   </p:cSld>
@@ -2092,7 +2099,7 @@
           <a:p>
             <a:r>
               <a:rPr lang="en-US" dirty="0"/>
-              <a:t>I don’t want to complain about Docker too much, and please don’t take offense if you’ve already invested the time in developing and using a Docker workflow. I want to honor that work and level of commitment, but getting a development environment running, so we can do some work, should not require that level of commitment. Awesome and Awful. You get building blocks, and it runs on most anything. But, it’s complicated, and hard.</a:t>
+              <a:t>We aren’t going to dive deeply into Docker, because we don’t need to, we just need to keep in mind that Docker is what enables Lando to help us build a development environment. The most important part to know is that Docker is software that helps us organize our project environments into the parts we need. Like a database and an app server.</a:t>
             </a:r>
           </a:p>
         </p:txBody>
@@ -2114,7 +2121,7 @@
           <a:p>
             <a:fld id="{07F65287-0258-BC43-8221-F86E5F96768A}" type="slidenum">
               <a:rPr lang="en-US" smtClean="0"/>
-              <a:t>5</a:t>
+              <a:t>4</a:t>
             </a:fld>
             <a:endParaRPr lang="en-US"/>
           </a:p>
@@ -2123,7 +2130,7 @@
     </p:spTree>
     <p:extLst>
       <p:ext uri="{BB962C8B-B14F-4D97-AF65-F5344CB8AC3E}">
-        <p14:creationId xmlns:p14="http://schemas.microsoft.com/office/powerpoint/2010/main" val="1056243610"/>
+        <p14:creationId xmlns:p14="http://schemas.microsoft.com/office/powerpoint/2010/main" val="3064967801"/>
       </p:ext>
     </p:extLst>
   </p:cSld>
@@ -2177,144 +2184,9 @@
           <a:bodyPr/>
           <a:lstStyle/>
           <a:p>
-            <a:pPr marL="0" marR="0" lvl="0" indent="0" algn="l" defTabSz="914400" rtl="0" eaLnBrk="1" fontAlgn="auto" latinLnBrk="0" hangingPunct="1">
-              <a:lnSpc>
-                <a:spcPct val="100000"/>
-              </a:lnSpc>
-              <a:spcBef>
-                <a:spcPts val="0"/>
-              </a:spcBef>
-              <a:spcAft>
-                <a:spcPts val="0"/>
-              </a:spcAft>
-              <a:buClrTx/>
-              <a:buSzTx/>
-              <a:buFontTx/>
-              <a:buNone/>
-              <a:tabLst/>
-              <a:defRPr/>
-            </a:pPr>
-            <a:r>
-              <a:rPr lang="en-US" dirty="0"/>
-              <a:t>This is a famous cathedral in Barcelona, </a:t>
-            </a:r>
-            <a:r>
-              <a:rPr lang="en-US" sz="1200" b="0" i="0" kern="1200" dirty="0">
-                <a:solidFill>
-                  <a:schemeClr val="tx1"/>
-                </a:solidFill>
-                <a:effectLst/>
-                <a:latin typeface="+mn-lt"/>
-                <a:ea typeface="+mn-ea"/>
-                <a:cs typeface="+mn-cs"/>
-              </a:rPr>
-              <a:t>Sagrada </a:t>
-            </a:r>
-            <a:r>
-              <a:rPr lang="en-US" sz="1200" b="0" i="0" kern="1200" dirty="0" err="1">
-                <a:solidFill>
-                  <a:schemeClr val="tx1"/>
-                </a:solidFill>
-                <a:effectLst/>
-                <a:latin typeface="+mn-lt"/>
-                <a:ea typeface="+mn-ea"/>
-                <a:cs typeface="+mn-cs"/>
-              </a:rPr>
-              <a:t>Família</a:t>
-            </a:r>
-            <a:r>
-              <a:rPr lang="en-US" sz="1200" b="0" i="0" kern="1200" dirty="0">
-                <a:solidFill>
-                  <a:schemeClr val="tx1"/>
-                </a:solidFill>
-                <a:effectLst/>
-                <a:latin typeface="+mn-lt"/>
-                <a:ea typeface="+mn-ea"/>
-                <a:cs typeface="+mn-cs"/>
-              </a:rPr>
-              <a:t> ('Basilica of the Holy Family’), by Antoni </a:t>
-            </a:r>
-            <a:r>
-              <a:rPr lang="en-US" sz="1200" b="0" i="0" kern="1200" dirty="0" err="1">
-                <a:solidFill>
-                  <a:schemeClr val="tx1"/>
-                </a:solidFill>
-                <a:effectLst/>
-                <a:latin typeface="+mn-lt"/>
-                <a:ea typeface="+mn-ea"/>
-                <a:cs typeface="+mn-cs"/>
-              </a:rPr>
-              <a:t>Gaudí</a:t>
-            </a:r>
-            <a:r>
-              <a:rPr lang="en-US" sz="1200" b="0" i="0" kern="1200" dirty="0">
-                <a:solidFill>
-                  <a:schemeClr val="tx1"/>
-                </a:solidFill>
-                <a:effectLst/>
-                <a:latin typeface="+mn-lt"/>
-                <a:ea typeface="+mn-ea"/>
-                <a:cs typeface="+mn-cs"/>
-              </a:rPr>
-              <a:t>, it began construction in March of 1882. It’s still not done. I have a picture of this cathedral on my office wall, as a reminder that Perfect may not be attainable, and as a visual reminder of what the quest for perfection can look like.</a:t>
-            </a:r>
-            <a:br>
-              <a:rPr lang="en-US" sz="1200" b="0" i="0" kern="1200" dirty="0">
-                <a:solidFill>
-                  <a:schemeClr val="tx1"/>
-                </a:solidFill>
-                <a:effectLst/>
-                <a:latin typeface="+mn-lt"/>
-                <a:ea typeface="+mn-ea"/>
-                <a:cs typeface="+mn-cs"/>
-              </a:rPr>
-            </a:br>
-            <a:br>
-              <a:rPr lang="en-US" sz="1200" b="0" i="0" kern="1200" dirty="0">
-                <a:solidFill>
-                  <a:schemeClr val="tx1"/>
-                </a:solidFill>
-                <a:effectLst/>
-                <a:latin typeface="+mn-lt"/>
-                <a:ea typeface="+mn-ea"/>
-                <a:cs typeface="+mn-cs"/>
-              </a:rPr>
-            </a:br>
-            <a:r>
-              <a:rPr lang="en-US" sz="1200" b="0" i="0" kern="1200" dirty="0">
-                <a:solidFill>
-                  <a:schemeClr val="tx1"/>
-                </a:solidFill>
-                <a:effectLst/>
-                <a:latin typeface="+mn-lt"/>
-                <a:ea typeface="+mn-ea"/>
-                <a:cs typeface="+mn-cs"/>
-              </a:rPr>
-              <a:t>I have this picture in these slides to say, Docker can be used to build huge and beautiful </a:t>
-            </a:r>
-            <a:r>
-              <a:rPr lang="en-US" sz="1200" b="0" i="0" kern="1200" dirty="0" err="1">
-                <a:solidFill>
-                  <a:schemeClr val="tx1"/>
-                </a:solidFill>
-                <a:effectLst/>
-                <a:latin typeface="+mn-lt"/>
-                <a:ea typeface="+mn-ea"/>
-                <a:cs typeface="+mn-cs"/>
-              </a:rPr>
-              <a:t>worklfows</a:t>
-            </a:r>
-            <a:r>
-              <a:rPr lang="en-US" sz="1200" b="0" i="0" kern="1200" dirty="0">
-                <a:solidFill>
-                  <a:schemeClr val="tx1"/>
-                </a:solidFill>
-                <a:effectLst/>
-                <a:latin typeface="+mn-lt"/>
-                <a:ea typeface="+mn-ea"/>
-                <a:cs typeface="+mn-cs"/>
-              </a:rPr>
-              <a:t>. We won’t be doing anything like that today. We are going to be building dev environments, so we can get to work.</a:t>
+            <a:r>
+              <a:rPr lang="en-US" dirty="0"/>
+              <a:t>I don’t want to complain about Docker too much, and please don’t take offense if you’ve already invested the time in developing and using a Docker workflow. I want to honor that work and level of commitment, but getting a development environment running, so we can do some work, should not require that level of commitment. Awesome and Awful. You get building blocks, and it runs on most anything. But, it’s complicated, and hard.</a:t>
             </a:r>
           </a:p>
         </p:txBody>
@@ -2336,7 +2208,7 @@
           <a:p>
             <a:fld id="{07F65287-0258-BC43-8221-F86E5F96768A}" type="slidenum">
               <a:rPr lang="en-US" smtClean="0"/>
-              <a:t>6</a:t>
+              <a:t>5</a:t>
             </a:fld>
             <a:endParaRPr lang="en-US"/>
           </a:p>
@@ -2345,7 +2217,7 @@
     </p:spTree>
     <p:extLst>
       <p:ext uri="{BB962C8B-B14F-4D97-AF65-F5344CB8AC3E}">
-        <p14:creationId xmlns:p14="http://schemas.microsoft.com/office/powerpoint/2010/main" val="2374772773"/>
+        <p14:creationId xmlns:p14="http://schemas.microsoft.com/office/powerpoint/2010/main" val="1056243610"/>
       </p:ext>
     </p:extLst>
   </p:cSld>
@@ -2399,9 +2271,144 @@
           <a:bodyPr/>
           <a:lstStyle/>
           <a:p>
-            <a:r>
-              <a:rPr lang="en-US" dirty="0"/>
-              <a:t>The main Lando page makes it very clear that Docker containers built by Lando are not to be used in production. This warning applies to almost any community-supported container you might pull down from Docker Hub: they are built for other reasons, mostly for developer convenience. For example: the official Tomcat containers from Apache all run as root. You do not want to run Tomcat as root. In a development environment, it’s fine, you know, whatever, let’s just get cracking. But you want your production site to be secure.</a:t>
+            <a:pPr marL="0" marR="0" lvl="0" indent="0" algn="l" defTabSz="914400" rtl="0" eaLnBrk="1" fontAlgn="auto" latinLnBrk="0" hangingPunct="1">
+              <a:lnSpc>
+                <a:spcPct val="100000"/>
+              </a:lnSpc>
+              <a:spcBef>
+                <a:spcPts val="0"/>
+              </a:spcBef>
+              <a:spcAft>
+                <a:spcPts val="0"/>
+              </a:spcAft>
+              <a:buClrTx/>
+              <a:buSzTx/>
+              <a:buFontTx/>
+              <a:buNone/>
+              <a:tabLst/>
+              <a:defRPr/>
+            </a:pPr>
+            <a:r>
+              <a:rPr lang="en-US" dirty="0"/>
+              <a:t>This is a famous cathedral in Barcelona, </a:t>
+            </a:r>
+            <a:r>
+              <a:rPr lang="en-US" sz="1200" b="0" i="0" kern="1200" dirty="0">
+                <a:solidFill>
+                  <a:schemeClr val="tx1"/>
+                </a:solidFill>
+                <a:effectLst/>
+                <a:latin typeface="+mn-lt"/>
+                <a:ea typeface="+mn-ea"/>
+                <a:cs typeface="+mn-cs"/>
+              </a:rPr>
+              <a:t>Sagrada </a:t>
+            </a:r>
+            <a:r>
+              <a:rPr lang="en-US" sz="1200" b="0" i="0" kern="1200" dirty="0" err="1">
+                <a:solidFill>
+                  <a:schemeClr val="tx1"/>
+                </a:solidFill>
+                <a:effectLst/>
+                <a:latin typeface="+mn-lt"/>
+                <a:ea typeface="+mn-ea"/>
+                <a:cs typeface="+mn-cs"/>
+              </a:rPr>
+              <a:t>Família</a:t>
+            </a:r>
+            <a:r>
+              <a:rPr lang="en-US" sz="1200" b="0" i="0" kern="1200" dirty="0">
+                <a:solidFill>
+                  <a:schemeClr val="tx1"/>
+                </a:solidFill>
+                <a:effectLst/>
+                <a:latin typeface="+mn-lt"/>
+                <a:ea typeface="+mn-ea"/>
+                <a:cs typeface="+mn-cs"/>
+              </a:rPr>
+              <a:t> ('Basilica of the Holy Family’), by Antoni </a:t>
+            </a:r>
+            <a:r>
+              <a:rPr lang="en-US" sz="1200" b="0" i="0" kern="1200" dirty="0" err="1">
+                <a:solidFill>
+                  <a:schemeClr val="tx1"/>
+                </a:solidFill>
+                <a:effectLst/>
+                <a:latin typeface="+mn-lt"/>
+                <a:ea typeface="+mn-ea"/>
+                <a:cs typeface="+mn-cs"/>
+              </a:rPr>
+              <a:t>Gaudí</a:t>
+            </a:r>
+            <a:r>
+              <a:rPr lang="en-US" sz="1200" b="0" i="0" kern="1200" dirty="0">
+                <a:solidFill>
+                  <a:schemeClr val="tx1"/>
+                </a:solidFill>
+                <a:effectLst/>
+                <a:latin typeface="+mn-lt"/>
+                <a:ea typeface="+mn-ea"/>
+                <a:cs typeface="+mn-cs"/>
+              </a:rPr>
+              <a:t>, it began construction in March of 1882. It’s still not done. I have a picture of this cathedral on my office wall, as a reminder that Perfect may not be attainable, and as a visual reminder of what the quest for perfection can look like.</a:t>
+            </a:r>
+            <a:br>
+              <a:rPr lang="en-US" sz="1200" b="0" i="0" kern="1200" dirty="0">
+                <a:solidFill>
+                  <a:schemeClr val="tx1"/>
+                </a:solidFill>
+                <a:effectLst/>
+                <a:latin typeface="+mn-lt"/>
+                <a:ea typeface="+mn-ea"/>
+                <a:cs typeface="+mn-cs"/>
+              </a:rPr>
+            </a:br>
+            <a:br>
+              <a:rPr lang="en-US" sz="1200" b="0" i="0" kern="1200" dirty="0">
+                <a:solidFill>
+                  <a:schemeClr val="tx1"/>
+                </a:solidFill>
+                <a:effectLst/>
+                <a:latin typeface="+mn-lt"/>
+                <a:ea typeface="+mn-ea"/>
+                <a:cs typeface="+mn-cs"/>
+              </a:rPr>
+            </a:br>
+            <a:r>
+              <a:rPr lang="en-US" sz="1200" b="0" i="0" kern="1200" dirty="0">
+                <a:solidFill>
+                  <a:schemeClr val="tx1"/>
+                </a:solidFill>
+                <a:effectLst/>
+                <a:latin typeface="+mn-lt"/>
+                <a:ea typeface="+mn-ea"/>
+                <a:cs typeface="+mn-cs"/>
+              </a:rPr>
+              <a:t>I have this picture in these slides to say, Docker can be used to build huge and beautiful </a:t>
+            </a:r>
+            <a:r>
+              <a:rPr lang="en-US" sz="1200" b="0" i="0" kern="1200" dirty="0" err="1">
+                <a:solidFill>
+                  <a:schemeClr val="tx1"/>
+                </a:solidFill>
+                <a:effectLst/>
+                <a:latin typeface="+mn-lt"/>
+                <a:ea typeface="+mn-ea"/>
+                <a:cs typeface="+mn-cs"/>
+              </a:rPr>
+              <a:t>worklfows</a:t>
+            </a:r>
+            <a:r>
+              <a:rPr lang="en-US" sz="1200" b="0" i="0" kern="1200" dirty="0">
+                <a:solidFill>
+                  <a:schemeClr val="tx1"/>
+                </a:solidFill>
+                <a:effectLst/>
+                <a:latin typeface="+mn-lt"/>
+                <a:ea typeface="+mn-ea"/>
+                <a:cs typeface="+mn-cs"/>
+              </a:rPr>
+              <a:t>. We won’t be doing anything like that today. We are going to be building dev environments, so we can get to work.</a:t>
             </a:r>
           </a:p>
         </p:txBody>
@@ -2423,7 +2430,7 @@
           <a:p>
             <a:fld id="{07F65287-0258-BC43-8221-F86E5F96768A}" type="slidenum">
               <a:rPr lang="en-US" smtClean="0"/>
-              <a:t>7</a:t>
+              <a:t>6</a:t>
             </a:fld>
             <a:endParaRPr lang="en-US"/>
           </a:p>
@@ -2432,7 +2439,7 @@
     </p:spTree>
     <p:extLst>
       <p:ext uri="{BB962C8B-B14F-4D97-AF65-F5344CB8AC3E}">
-        <p14:creationId xmlns:p14="http://schemas.microsoft.com/office/powerpoint/2010/main" val="1344439785"/>
+        <p14:creationId xmlns:p14="http://schemas.microsoft.com/office/powerpoint/2010/main" val="2374772773"/>
       </p:ext>
     </p:extLst>
   </p:cSld>
@@ -2488,7 +2495,7 @@
           <a:p>
             <a:r>
               <a:rPr lang="en-US" dirty="0"/>
-              <a:t>If you can’t have a perfect workflow, using the same containers in dev as prod, why bother? Honestly, it’s scope creep. I’m here to talk about making some dev environments. You can work on your perfect ideal workflow on your own time. Let’s get to work.</a:t>
+              <a:t>The main Lando page makes it very clear that Docker containers built by Lando are not to be used in production. This warning applies to almost any community-supported container you might pull down from Docker Hub: they are built for other reasons, mostly for developer convenience. For example: the official Tomcat containers from Apache all run as root. You do not want to run Tomcat as root. In a development environment, it’s fine, you know, whatever, let’s just get cracking. But you want your production site to be secure.</a:t>
             </a:r>
           </a:p>
         </p:txBody>
@@ -2510,7 +2517,7 @@
           <a:p>
             <a:fld id="{07F65287-0258-BC43-8221-F86E5F96768A}" type="slidenum">
               <a:rPr lang="en-US" smtClean="0"/>
-              <a:t>8</a:t>
+              <a:t>7</a:t>
             </a:fld>
             <a:endParaRPr lang="en-US"/>
           </a:p>
@@ -2519,7 +2526,7 @@
     </p:spTree>
     <p:extLst>
       <p:ext uri="{BB962C8B-B14F-4D97-AF65-F5344CB8AC3E}">
-        <p14:creationId xmlns:p14="http://schemas.microsoft.com/office/powerpoint/2010/main" val="1769581732"/>
+        <p14:creationId xmlns:p14="http://schemas.microsoft.com/office/powerpoint/2010/main" val="1344439785"/>
       </p:ext>
     </p:extLst>
   </p:cSld>
@@ -2575,7 +2582,7 @@
           <a:p>
             <a:r>
               <a:rPr lang="en-US" dirty="0"/>
-              <a:t>The Lando community declares Lando is a “per app, single config file, containerized everything, local dev tool.” Let’s break that down a bit. You start with one simple config file, you mix/match preconfigured stacks, add in extra services, add tooling and automation, it runs wherever Docker runs. It helps smooth out the rough edges of Docker.</a:t>
+              <a:t>If you can’t have a perfect workflow, using the same containers in dev as prod, why bother? Honestly, it’s scope creep. I’m here to talk about making some dev environments. You can work on your perfect ideal workflow on your own time. Let’s get to work.</a:t>
             </a:r>
           </a:p>
         </p:txBody>
@@ -2597,7 +2604,7 @@
           <a:p>
             <a:fld id="{07F65287-0258-BC43-8221-F86E5F96768A}" type="slidenum">
               <a:rPr lang="en-US" smtClean="0"/>
-              <a:t>9</a:t>
+              <a:t>8</a:t>
             </a:fld>
             <a:endParaRPr lang="en-US"/>
           </a:p>
@@ -2606,7 +2613,7 @@
     </p:spTree>
     <p:extLst>
       <p:ext uri="{BB962C8B-B14F-4D97-AF65-F5344CB8AC3E}">
-        <p14:creationId xmlns:p14="http://schemas.microsoft.com/office/powerpoint/2010/main" val="4055699967"/>
+        <p14:creationId xmlns:p14="http://schemas.microsoft.com/office/powerpoint/2010/main" val="1769581732"/>
       </p:ext>
     </p:extLst>
   </p:cSld>
@@ -2662,15 +2669,7 @@
           <a:p>
             <a:r>
               <a:rPr lang="en-US" dirty="0"/>
-              <a:t>I should admit right now that I’ve borrowed these intro slides from the Lando folks, they have a Google drive full of slide decks. Like a lot of opensource projects, they have a ton of resources and docs. The best place to start reading about Lando is </a:t>
-            </a:r>
-            <a:r>
-              <a:rPr lang="en-US" dirty="0" err="1"/>
-              <a:t>docs.lando.dev</a:t>
-            </a:r>
-            <a:r>
-              <a:rPr lang="en-US" dirty="0"/>
-              <a:t>. “Stacks on Stacks on Racks” is their explanation of Lando. It starts with your operating system, which includes tech for containers, and then Docker running on that, and Docker Compose on top of Docker, and then Lando.</a:t>
+              <a:t>The Lando community declares Lando is a “per app, single config file, containerized everything, local dev tool.” Let’s break that down a bit. You start with one simple config file, you mix/match preconfigured stacks, add in extra services, add tooling and automation, it runs wherever Docker runs. It helps smooth out the rough edges of Docker.</a:t>
             </a:r>
           </a:p>
         </p:txBody>
@@ -2692,7 +2691,7 @@
           <a:p>
             <a:fld id="{07F65287-0258-BC43-8221-F86E5F96768A}" type="slidenum">
               <a:rPr lang="en-US" smtClean="0"/>
-              <a:t>10</a:t>
+              <a:t>9</a:t>
             </a:fld>
             <a:endParaRPr lang="en-US"/>
           </a:p>
@@ -2701,7 +2700,7 @@
     </p:spTree>
     <p:extLst>
       <p:ext uri="{BB962C8B-B14F-4D97-AF65-F5344CB8AC3E}">
-        <p14:creationId xmlns:p14="http://schemas.microsoft.com/office/powerpoint/2010/main" val="326291708"/>
+        <p14:creationId xmlns:p14="http://schemas.microsoft.com/office/powerpoint/2010/main" val="4055699967"/>
       </p:ext>
     </p:extLst>
   </p:cSld>
@@ -2991,7 +2990,7 @@
           <a:p>
             <a:fld id="{DC542904-3975-4E3E-BBB9-A828B1A3FA3D}" type="datetimeFigureOut">
               <a:rPr lang="en-US" smtClean="0"/>
-              <a:t>3/16/21</a:t>
+              <a:t>3/18/21</a:t>
             </a:fld>
             <a:endParaRPr lang="en-US"/>
           </a:p>
@@ -3223,7 +3222,7 @@
           <a:p>
             <a:fld id="{DC542904-3975-4E3E-BBB9-A828B1A3FA3D}" type="datetimeFigureOut">
               <a:rPr lang="en-US" smtClean="0"/>
-              <a:t>3/16/21</a:t>
+              <a:t>3/18/21</a:t>
             </a:fld>
             <a:endParaRPr lang="en-US"/>
           </a:p>
@@ -3455,7 +3454,7 @@
           <a:p>
             <a:fld id="{DC542904-3975-4E3E-BBB9-A828B1A3FA3D}" type="datetimeFigureOut">
               <a:rPr lang="en-US" smtClean="0"/>
-              <a:t>3/16/21</a:t>
+              <a:t>3/18/21</a:t>
             </a:fld>
             <a:endParaRPr lang="en-US"/>
           </a:p>
@@ -3754,7 +3753,7 @@
           <a:p>
             <a:fld id="{DC542904-3975-4E3E-BBB9-A828B1A3FA3D}" type="datetimeFigureOut">
               <a:rPr lang="en-US" smtClean="0"/>
-              <a:t>3/16/21</a:t>
+              <a:t>3/18/21</a:t>
             </a:fld>
             <a:endParaRPr lang="en-US"/>
           </a:p>
@@ -4048,7 +4047,7 @@
           <a:p>
             <a:fld id="{DC542904-3975-4E3E-BBB9-A828B1A3FA3D}" type="datetimeFigureOut">
               <a:rPr lang="en-US" smtClean="0"/>
-              <a:t>3/16/21</a:t>
+              <a:t>3/18/21</a:t>
             </a:fld>
             <a:endParaRPr lang="en-US"/>
           </a:p>
@@ -4484,7 +4483,7 @@
           <a:p>
             <a:fld id="{DC542904-3975-4E3E-BBB9-A828B1A3FA3D}" type="datetimeFigureOut">
               <a:rPr lang="en-US" smtClean="0"/>
-              <a:t>3/16/21</a:t>
+              <a:t>3/18/21</a:t>
             </a:fld>
             <a:endParaRPr lang="en-US"/>
           </a:p>
@@ -4654,7 +4653,7 @@
           <a:p>
             <a:fld id="{DC542904-3975-4E3E-BBB9-A828B1A3FA3D}" type="datetimeFigureOut">
               <a:rPr lang="en-US" smtClean="0"/>
-              <a:t>3/16/21</a:t>
+              <a:t>3/18/21</a:t>
             </a:fld>
             <a:endParaRPr lang="en-US"/>
           </a:p>
@@ -4791,7 +4790,7 @@
           <a:p>
             <a:fld id="{DC542904-3975-4E3E-BBB9-A828B1A3FA3D}" type="datetimeFigureOut">
               <a:rPr lang="en-US" smtClean="0"/>
-              <a:t>3/16/21</a:t>
+              <a:t>3/18/21</a:t>
             </a:fld>
             <a:endParaRPr lang="en-US"/>
           </a:p>
@@ -5128,7 +5127,7 @@
           <a:p>
             <a:fld id="{DC542904-3975-4E3E-BBB9-A828B1A3FA3D}" type="datetimeFigureOut">
               <a:rPr lang="en-US" smtClean="0"/>
-              <a:t>3/16/21</a:t>
+              <a:t>3/18/21</a:t>
             </a:fld>
             <a:endParaRPr lang="en-US"/>
           </a:p>
@@ -5442,7 +5441,7 @@
           <a:p>
             <a:fld id="{DC542904-3975-4E3E-BBB9-A828B1A3FA3D}" type="datetimeFigureOut">
               <a:rPr lang="en-US" smtClean="0"/>
-              <a:t>3/16/21</a:t>
+              <a:t>3/18/21</a:t>
             </a:fld>
             <a:endParaRPr lang="en-US"/>
           </a:p>
@@ -6051,7 +6050,7 @@
           <a:p>
             <a:r>
               <a:rPr lang="en-US" dirty="0">
-                <a:hlinkClick r:id="rId2"/>
+                <a:hlinkClick r:id="rId3"/>
               </a:rPr>
               <a:t>hardy.pottinger@ucop.edu</a:t>
             </a:r>
@@ -6116,7 +6115,7 @@
           <p:nvPr/>
         </p:nvPicPr>
         <p:blipFill>
-          <a:blip r:embed="rId3"/>
+          <a:blip r:embed="rId4"/>
           <a:stretch>
             <a:fillRect/>
           </a:stretch>
@@ -6146,7 +6145,7 @@
           <p:nvPr/>
         </p:nvPicPr>
         <p:blipFill>
-          <a:blip r:embed="rId4">
+          <a:blip r:embed="rId5">
             <a:extLst>
               <a:ext uri="{28A0092B-C50C-407E-A947-70E740481C1C}">
                 <a14:useLocalDpi xmlns:a14="http://schemas.microsoft.com/office/drawing/2010/main" val="0"/>
@@ -6212,7 +6211,7 @@
             </a:r>
             <a:r>
               <a:rPr lang="en-US" u="sng" dirty="0">
-                <a:hlinkClick r:id="rId5"/>
+                <a:hlinkClick r:id="rId6"/>
               </a:rPr>
               <a:t>Creative Commons Attribution 4.0 International License</a:t>
             </a:r>
@@ -9001,7 +9000,7 @@
           <p:cNvPr id="2" name="Title 1">
             <a:extLst>
               <a:ext uri="{FF2B5EF4-FFF2-40B4-BE49-F238E27FC236}">
-                <a16:creationId xmlns:a16="http://schemas.microsoft.com/office/drawing/2014/main" id="{D6A23C41-493D-424B-8C82-01C1E6707DAD}"/>
+                <a16:creationId xmlns:a16="http://schemas.microsoft.com/office/drawing/2014/main" id="{E228AC91-6098-F144-B508-084DE48E6304}"/>
               </a:ext>
             </a:extLst>
           </p:cNvPr>
@@ -9019,7 +9018,7 @@
           <a:p>
             <a:r>
               <a:rPr lang="en-US" dirty="0"/>
-              <a:t>Questions?</a:t>
+              <a:t>One quick demo: A MySQL environment</a:t>
             </a:r>
           </a:p>
         </p:txBody>
@@ -9029,7 +9028,7 @@
           <p:cNvPr id="3" name="Text Placeholder 2">
             <a:extLst>
               <a:ext uri="{FF2B5EF4-FFF2-40B4-BE49-F238E27FC236}">
-                <a16:creationId xmlns:a16="http://schemas.microsoft.com/office/drawing/2014/main" id="{956277A2-A008-EC47-9DAD-A5091B32E39C}"/>
+                <a16:creationId xmlns:a16="http://schemas.microsoft.com/office/drawing/2014/main" id="{97CB21E6-C5B0-F84F-B2AF-ABADE9B4086C}"/>
               </a:ext>
             </a:extLst>
           </p:cNvPr>
@@ -9040,19 +9039,129 @@
             <p:ph type="body" idx="1"/>
           </p:nvPr>
         </p:nvSpPr>
-        <p:spPr/>
-        <p:txBody>
-          <a:bodyPr/>
-          <a:lstStyle/>
-          <a:p>
-            <a:endParaRPr lang="en-US"/>
+        <p:spPr>
+          <a:xfrm>
+            <a:off x="374647" y="3811248"/>
+            <a:ext cx="10515600" cy="2333074"/>
+          </a:xfrm>
+        </p:spPr>
+        <p:txBody>
+          <a:bodyPr>
+            <a:normAutofit/>
+          </a:bodyPr>
+          <a:lstStyle/>
+          <a:p>
+            <a:r>
+              <a:rPr lang="en-US" dirty="0" err="1">
+                <a:solidFill>
+                  <a:schemeClr val="tx1"/>
+                </a:solidFill>
+                <a:latin typeface="Cousine" panose="02070409020205020404" pitchFamily="49" charset="0"/>
+                <a:cs typeface="Cousine" panose="02070409020205020404" pitchFamily="49" charset="0"/>
+              </a:rPr>
+              <a:t>lando</a:t>
+            </a:r>
+            <a:r>
+              <a:rPr lang="en-US" dirty="0">
+                <a:solidFill>
+                  <a:schemeClr val="tx1"/>
+                </a:solidFill>
+                <a:latin typeface="Cousine" panose="02070409020205020404" pitchFamily="49" charset="0"/>
+                <a:cs typeface="Cousine" panose="02070409020205020404" pitchFamily="49" charset="0"/>
+              </a:rPr>
+              <a:t> </a:t>
+            </a:r>
+            <a:r>
+              <a:rPr lang="en-US" dirty="0" err="1">
+                <a:solidFill>
+                  <a:schemeClr val="tx1"/>
+                </a:solidFill>
+                <a:latin typeface="Cousine" panose="02070409020205020404" pitchFamily="49" charset="0"/>
+                <a:cs typeface="Cousine" panose="02070409020205020404" pitchFamily="49" charset="0"/>
+              </a:rPr>
+              <a:t>init</a:t>
+            </a:r>
+            <a:r>
+              <a:rPr lang="en-US" dirty="0">
+                <a:solidFill>
+                  <a:schemeClr val="tx1"/>
+                </a:solidFill>
+                <a:latin typeface="Cousine" panose="02070409020205020404" pitchFamily="49" charset="0"/>
+                <a:cs typeface="Cousine" panose="02070409020205020404" pitchFamily="49" charset="0"/>
+              </a:rPr>
+              <a:t> --full</a:t>
+            </a:r>
+          </a:p>
+          <a:p>
+            <a:r>
+              <a:rPr lang="en-US" dirty="0">
+                <a:solidFill>
+                  <a:schemeClr val="tx1"/>
+                </a:solidFill>
+                <a:latin typeface="Cousine" panose="02070409020205020404" pitchFamily="49" charset="0"/>
+                <a:cs typeface="Cousine" panose="02070409020205020404" pitchFamily="49" charset="0"/>
+              </a:rPr>
+              <a:t>  #Lie about using LAMP</a:t>
+            </a:r>
+          </a:p>
+          <a:p>
+            <a:r>
+              <a:rPr lang="en-US" dirty="0">
+                <a:solidFill>
+                  <a:schemeClr val="tx1"/>
+                </a:solidFill>
+                <a:latin typeface="Cousine" panose="02070409020205020404" pitchFamily="49" charset="0"/>
+                <a:cs typeface="Cousine" panose="02070409020205020404" pitchFamily="49" charset="0"/>
+              </a:rPr>
+              <a:t>  #delete all the PHP stuff</a:t>
+            </a:r>
+          </a:p>
+          <a:p>
+            <a:r>
+              <a:rPr lang="en-US" dirty="0">
+                <a:solidFill>
+                  <a:schemeClr val="tx1"/>
+                </a:solidFill>
+                <a:latin typeface="Cousine" panose="02070409020205020404" pitchFamily="49" charset="0"/>
+                <a:cs typeface="Cousine" panose="02070409020205020404" pitchFamily="49" charset="0"/>
+              </a:rPr>
+              <a:t>  #forward the MySQL port</a:t>
+            </a:r>
+          </a:p>
+          <a:p>
+            <a:r>
+              <a:rPr lang="en-US" dirty="0" err="1">
+                <a:solidFill>
+                  <a:schemeClr val="tx1"/>
+                </a:solidFill>
+                <a:latin typeface="Cousine" panose="02070409020205020404" pitchFamily="49" charset="0"/>
+                <a:cs typeface="Cousine" panose="02070409020205020404" pitchFamily="49" charset="0"/>
+              </a:rPr>
+              <a:t>lando</a:t>
+            </a:r>
+            <a:r>
+              <a:rPr lang="en-US" dirty="0">
+                <a:solidFill>
+                  <a:schemeClr val="tx1"/>
+                </a:solidFill>
+                <a:latin typeface="Cousine" panose="02070409020205020404" pitchFamily="49" charset="0"/>
+                <a:cs typeface="Cousine" panose="02070409020205020404" pitchFamily="49" charset="0"/>
+              </a:rPr>
+              <a:t> info</a:t>
+            </a:r>
+          </a:p>
+          <a:p>
+            <a:endParaRPr lang="en-US" dirty="0">
+              <a:latin typeface="Cousine" panose="02070409020205020404" pitchFamily="49" charset="0"/>
+              <a:cs typeface="Cousine" panose="02070409020205020404" pitchFamily="49" charset="0"/>
+            </a:endParaRPr>
           </a:p>
         </p:txBody>
       </p:sp>
     </p:spTree>
     <p:extLst>
       <p:ext uri="{BB962C8B-B14F-4D97-AF65-F5344CB8AC3E}">
-        <p14:creationId xmlns:p14="http://schemas.microsoft.com/office/powerpoint/2010/main" val="2081146988"/>
+        <p14:creationId xmlns:p14="http://schemas.microsoft.com/office/powerpoint/2010/main" val="2597285647"/>
       </p:ext>
     </p:extLst>
   </p:cSld>
@@ -9084,89 +9193,6 @@
           <p:cNvPr id="2" name="Title 1">
             <a:extLst>
               <a:ext uri="{FF2B5EF4-FFF2-40B4-BE49-F238E27FC236}">
-                <a16:creationId xmlns:a16="http://schemas.microsoft.com/office/drawing/2014/main" id="{E228AC91-6098-F144-B508-084DE48E6304}"/>
-              </a:ext>
-            </a:extLst>
-          </p:cNvPr>
-          <p:cNvSpPr>
-            <a:spLocks noGrp="1"/>
-          </p:cNvSpPr>
-          <p:nvPr>
-            <p:ph type="title"/>
-          </p:nvPr>
-        </p:nvSpPr>
-        <p:spPr/>
-        <p:txBody>
-          <a:bodyPr/>
-          <a:lstStyle/>
-          <a:p>
-            <a:r>
-              <a:rPr lang="en-US" dirty="0"/>
-              <a:t>Demo: Using Lando</a:t>
-            </a:r>
-          </a:p>
-        </p:txBody>
-      </p:sp>
-      <p:sp>
-        <p:nvSpPr>
-          <p:cNvPr id="3" name="Text Placeholder 2">
-            <a:extLst>
-              <a:ext uri="{FF2B5EF4-FFF2-40B4-BE49-F238E27FC236}">
-                <a16:creationId xmlns:a16="http://schemas.microsoft.com/office/drawing/2014/main" id="{97CB21E6-C5B0-F84F-B2AF-ABADE9B4086C}"/>
-              </a:ext>
-            </a:extLst>
-          </p:cNvPr>
-          <p:cNvSpPr>
-            <a:spLocks noGrp="1"/>
-          </p:cNvSpPr>
-          <p:nvPr>
-            <p:ph type="body" idx="1"/>
-          </p:nvPr>
-        </p:nvSpPr>
-        <p:spPr/>
-        <p:txBody>
-          <a:bodyPr/>
-          <a:lstStyle/>
-          <a:p>
-            <a:endParaRPr lang="en-US"/>
-          </a:p>
-        </p:txBody>
-      </p:sp>
-    </p:spTree>
-    <p:extLst>
-      <p:ext uri="{BB962C8B-B14F-4D97-AF65-F5344CB8AC3E}">
-        <p14:creationId xmlns:p14="http://schemas.microsoft.com/office/powerpoint/2010/main" val="2597285647"/>
-      </p:ext>
-    </p:extLst>
-  </p:cSld>
-  <p:clrMapOvr>
-    <a:masterClrMapping/>
-  </p:clrMapOvr>
-</p:sld>
-</file>
-
-<file path=ppt/slides/slide22.xml><?xml version="1.0" encoding="utf-8"?>
-<p:sld xmlns:a="http://schemas.openxmlformats.org/drawingml/2006/main" xmlns:r="http://schemas.openxmlformats.org/officeDocument/2006/relationships" xmlns:p="http://schemas.openxmlformats.org/presentationml/2006/main">
-  <p:cSld>
-    <p:spTree>
-      <p:nvGrpSpPr>
-        <p:cNvPr id="1" name=""/>
-        <p:cNvGrpSpPr/>
-        <p:nvPr/>
-      </p:nvGrpSpPr>
-      <p:grpSpPr>
-        <a:xfrm>
-          <a:off x="0" y="0"/>
-          <a:ext cx="0" cy="0"/>
-          <a:chOff x="0" y="0"/>
-          <a:chExt cx="0" cy="0"/>
-        </a:xfrm>
-      </p:grpSpPr>
-      <p:sp>
-        <p:nvSpPr>
-          <p:cNvPr id="2" name="Title 1">
-            <a:extLst>
-              <a:ext uri="{FF2B5EF4-FFF2-40B4-BE49-F238E27FC236}">
                 <a16:creationId xmlns:a16="http://schemas.microsoft.com/office/drawing/2014/main" id="{D6A23C41-493D-424B-8C82-01C1E6707DAD}"/>
               </a:ext>
             </a:extLst>
@@ -9228,7 +9254,7 @@
 </p:sld>
 </file>
 
-<file path=ppt/slides/slide23.xml><?xml version="1.0" encoding="utf-8"?>
+<file path=ppt/slides/slide22.xml><?xml version="1.0" encoding="utf-8"?>
 <p:sld xmlns:a="http://schemas.openxmlformats.org/drawingml/2006/main" xmlns:r="http://schemas.openxmlformats.org/officeDocument/2006/relationships" xmlns:p="http://schemas.openxmlformats.org/presentationml/2006/main">
   <p:cSld>
     <p:spTree>

</xml_diff>